<commit_message>
add g paper / editorial fix
</commit_message>
<xml_diff>
--- a/Editorial/Overall/Editorial_of_NNSZCP-2023.pptx
+++ b/Editorial/Overall/Editorial_of_NNSZCP-2023.pptx
@@ -5,10 +5,10 @@
     <p:sldMasterId id="2147483648" r:id="rId1"/>
   </p:sldMasterIdLst>
   <p:notesMasterIdLst>
-    <p:notesMasterId r:id="rId57"/>
+    <p:notesMasterId r:id="rId58"/>
   </p:notesMasterIdLst>
   <p:handoutMasterIdLst>
-    <p:handoutMasterId r:id="rId58"/>
+    <p:handoutMasterId r:id="rId59"/>
   </p:handoutMasterIdLst>
   <p:sldIdLst>
     <p:sldId id="257" r:id="rId2"/>
@@ -66,6 +66,7 @@
     <p:sldId id="311" r:id="rId54"/>
     <p:sldId id="312" r:id="rId55"/>
     <p:sldId id="314" r:id="rId56"/>
+    <p:sldId id="318" r:id="rId57"/>
   </p:sldIdLst>
   <p:sldSz cx="12192000" cy="6858000"/>
   <p:notesSz cx="6858000" cy="9144000"/>
@@ -264,6 +265,11 @@
             <p14:sldId id="311"/>
             <p14:sldId id="312"/>
             <p14:sldId id="314"/>
+          </p14:sldIdLst>
+        </p14:section>
+        <p14:section name="Ending" id="{F0C54BCA-AFC9-4596-B530-BBAD2D0B979D}">
+          <p14:sldIdLst>
+            <p14:sldId id="318"/>
           </p14:sldIdLst>
         </p14:section>
       </p14:sectionLst>
@@ -14605,8 +14611,8 @@
           </a:p>
         </p:txBody>
       </p:sp>
-      <mc:AlternateContent xmlns:mc="http://schemas.openxmlformats.org/markup-compatibility/2006">
-        <mc:Choice xmlns:a14="http://schemas.microsoft.com/office/drawing/2010/main" Requires="a14">
+      <mc:AlternateContent xmlns:mc="http://schemas.openxmlformats.org/markup-compatibility/2006" xmlns:a14="http://schemas.microsoft.com/office/drawing/2010/main">
+        <mc:Choice Requires="a14">
           <p:sp>
             <p:nvSpPr>
               <p:cNvPr id="5" name="内容占位符 4">
@@ -15380,7 +15386,7 @@
             </p:txBody>
           </p:sp>
         </mc:Choice>
-        <mc:Fallback>
+        <mc:Fallback xmlns="">
           <p:sp>
             <p:nvSpPr>
               <p:cNvPr id="5" name="内容占位符 4">
@@ -20352,7 +20358,14 @@
               </a:rPr>
               <a:t>https://arxiv.org/pdf/2110.01111.pdf</a:t>
             </a:r>
-            <a:endParaRPr lang="zh-CN" altLang="en-US" sz="2400" dirty="0"/>
+            <a:endParaRPr lang="en-US" altLang="zh-CN" sz="2400" dirty="0"/>
+          </a:p>
+          <a:p>
+            <a:r>
+              <a:rPr lang="zh-CN" altLang="en-US" sz="2400" dirty="0"/>
+              <a:t>出题人出完题后看到了这篇论文，于是决定在这里分享。</a:t>
+            </a:r>
+            <a:endParaRPr lang="en-US" altLang="zh-CN" sz="2400" dirty="0"/>
           </a:p>
         </p:txBody>
       </p:sp>
@@ -37364,6 +37377,265 @@
       <p:bldP spid="3" grpId="0" build="p"/>
     </p:bldLst>
   </p:timing>
+</p:sld>
+</file>
+
+<file path=ppt/slides/slide56.xml><?xml version="1.0" encoding="utf-8"?>
+<p:sld xmlns:a="http://schemas.openxmlformats.org/drawingml/2006/main" xmlns:r="http://schemas.openxmlformats.org/officeDocument/2006/relationships" xmlns:p="http://schemas.openxmlformats.org/presentationml/2006/main">
+  <p:cSld>
+    <p:spTree>
+      <p:nvGrpSpPr>
+        <p:cNvPr id="1" name=""/>
+        <p:cNvGrpSpPr/>
+        <p:nvPr/>
+      </p:nvGrpSpPr>
+      <p:grpSpPr>
+        <a:xfrm>
+          <a:off x="0" y="0"/>
+          <a:ext cx="0" cy="0"/>
+          <a:chOff x="0" y="0"/>
+          <a:chExt cx="0" cy="0"/>
+        </a:xfrm>
+      </p:grpSpPr>
+      <p:sp>
+        <p:nvSpPr>
+          <p:cNvPr id="9" name="标题 8">
+            <a:extLst>
+              <a:ext uri="{FF2B5EF4-FFF2-40B4-BE49-F238E27FC236}">
+                <a16:creationId xmlns:a16="http://schemas.microsoft.com/office/drawing/2014/main" id="{7D52D309-EFB9-17BB-2DA6-92B9BC392E82}"/>
+              </a:ext>
+            </a:extLst>
+          </p:cNvPr>
+          <p:cNvSpPr>
+            <a:spLocks noGrp="1"/>
+          </p:cNvSpPr>
+          <p:nvPr>
+            <p:ph type="title"/>
+          </p:nvPr>
+        </p:nvSpPr>
+        <p:spPr/>
+        <p:txBody>
+          <a:bodyPr/>
+          <a:lstStyle/>
+          <a:p>
+            <a:r>
+              <a:rPr lang="zh-CN" altLang="en-US" dirty="0"/>
+              <a:t>没听明白？</a:t>
+            </a:r>
+          </a:p>
+        </p:txBody>
+      </p:sp>
+      <p:sp>
+        <p:nvSpPr>
+          <p:cNvPr id="10" name="内容占位符 9">
+            <a:extLst>
+              <a:ext uri="{FF2B5EF4-FFF2-40B4-BE49-F238E27FC236}">
+                <a16:creationId xmlns:a16="http://schemas.microsoft.com/office/drawing/2014/main" id="{32F542B2-8C35-EE14-53F9-C773936E46B2}"/>
+              </a:ext>
+            </a:extLst>
+          </p:cNvPr>
+          <p:cNvSpPr>
+            <a:spLocks noGrp="1"/>
+          </p:cNvSpPr>
+          <p:nvPr>
+            <p:ph idx="1"/>
+          </p:nvPr>
+        </p:nvSpPr>
+        <p:spPr/>
+        <p:txBody>
+          <a:bodyPr/>
+          <a:lstStyle/>
+          <a:p>
+            <a:r>
+              <a:rPr lang="zh-CN" altLang="en-US" dirty="0"/>
+              <a:t>访问 </a:t>
+            </a:r>
+            <a:r>
+              <a:rPr lang="en-US" altLang="zh-CN" dirty="0">
+                <a:hlinkClick r:id="rId2"/>
+              </a:rPr>
+              <a:t>https://github.com/nnszoi-team/nnszcp-2023</a:t>
+            </a:r>
+            <a:r>
+              <a:rPr lang="zh-CN" altLang="en-US" dirty="0"/>
+              <a:t>。</a:t>
+            </a:r>
+            <a:endParaRPr lang="en-US" altLang="zh-CN" dirty="0"/>
+          </a:p>
+          <a:p>
+            <a:r>
+              <a:rPr lang="zh-CN" altLang="en-US" dirty="0"/>
+              <a:t>或扫描这个二维码。</a:t>
+            </a:r>
+            <a:endParaRPr lang="en-US" altLang="zh-CN" dirty="0"/>
+          </a:p>
+          <a:p>
+            <a:endParaRPr lang="en-US" altLang="zh-CN" dirty="0"/>
+          </a:p>
+          <a:p>
+            <a:endParaRPr lang="en-US" altLang="zh-CN" dirty="0"/>
+          </a:p>
+          <a:p>
+            <a:endParaRPr lang="en-US" altLang="zh-CN" dirty="0"/>
+          </a:p>
+          <a:p>
+            <a:endParaRPr lang="en-US" altLang="zh-CN" dirty="0"/>
+          </a:p>
+          <a:p>
+            <a:endParaRPr lang="en-US" altLang="zh-CN" dirty="0"/>
+          </a:p>
+          <a:p>
+            <a:r>
+              <a:rPr lang="zh-CN" altLang="en-US" dirty="0"/>
+              <a:t>我们将在 </a:t>
+            </a:r>
+            <a:r>
+              <a:rPr lang="en-US" altLang="zh-CN" dirty="0"/>
+              <a:t>repo </a:t>
+            </a:r>
+            <a:r>
+              <a:rPr lang="zh-CN" altLang="en-US" dirty="0"/>
+              <a:t>里提供完整题解、数据、标程。</a:t>
+            </a:r>
+          </a:p>
+        </p:txBody>
+      </p:sp>
+      <p:sp>
+        <p:nvSpPr>
+          <p:cNvPr id="4" name="日期占位符 3">
+            <a:extLst>
+              <a:ext uri="{FF2B5EF4-FFF2-40B4-BE49-F238E27FC236}">
+                <a16:creationId xmlns:a16="http://schemas.microsoft.com/office/drawing/2014/main" id="{2615EB20-E31F-D9EF-8116-37D29E6EA01E}"/>
+              </a:ext>
+            </a:extLst>
+          </p:cNvPr>
+          <p:cNvSpPr>
+            <a:spLocks noGrp="1"/>
+          </p:cNvSpPr>
+          <p:nvPr>
+            <p:ph type="dt" sz="half" idx="10"/>
+          </p:nvPr>
+        </p:nvSpPr>
+        <p:spPr/>
+        <p:txBody>
+          <a:bodyPr/>
+          <a:lstStyle/>
+          <a:p>
+            <a:fld id="{5932CE07-503A-4A78-8286-F9F47CD19219}" type="datetime2">
+              <a:rPr lang="en-US" altLang="zh-CN" smtClean="0"/>
+              <a:t>Wednesday, December 6, 2023</a:t>
+            </a:fld>
+            <a:endParaRPr lang="zh-CN" altLang="en-US"/>
+          </a:p>
+        </p:txBody>
+      </p:sp>
+      <p:sp>
+        <p:nvSpPr>
+          <p:cNvPr id="5" name="页脚占位符 4">
+            <a:extLst>
+              <a:ext uri="{FF2B5EF4-FFF2-40B4-BE49-F238E27FC236}">
+                <a16:creationId xmlns:a16="http://schemas.microsoft.com/office/drawing/2014/main" id="{E7DE0465-28F2-EAC4-B2F5-8ED5C15E6CD3}"/>
+              </a:ext>
+            </a:extLst>
+          </p:cNvPr>
+          <p:cNvSpPr>
+            <a:spLocks noGrp="1"/>
+          </p:cNvSpPr>
+          <p:nvPr>
+            <p:ph type="ftr" sz="quarter" idx="11"/>
+          </p:nvPr>
+        </p:nvSpPr>
+        <p:spPr/>
+        <p:txBody>
+          <a:bodyPr/>
+          <a:lstStyle/>
+          <a:p>
+            <a:r>
+              <a:rPr lang="en-US" altLang="zh-CN"/>
+              <a:t>NNSZCP-2023 </a:t>
+            </a:r>
+            <a:r>
+              <a:rPr lang="zh-CN" altLang="en-US"/>
+              <a:t>赛后题解</a:t>
+            </a:r>
+          </a:p>
+        </p:txBody>
+      </p:sp>
+      <p:sp>
+        <p:nvSpPr>
+          <p:cNvPr id="6" name="灯片编号占位符 5">
+            <a:extLst>
+              <a:ext uri="{FF2B5EF4-FFF2-40B4-BE49-F238E27FC236}">
+                <a16:creationId xmlns:a16="http://schemas.microsoft.com/office/drawing/2014/main" id="{68546720-B2C8-FF27-07AE-57D035B293F5}"/>
+              </a:ext>
+            </a:extLst>
+          </p:cNvPr>
+          <p:cNvSpPr>
+            <a:spLocks noGrp="1"/>
+          </p:cNvSpPr>
+          <p:nvPr>
+            <p:ph type="sldNum" sz="quarter" idx="12"/>
+          </p:nvPr>
+        </p:nvSpPr>
+        <p:spPr/>
+        <p:txBody>
+          <a:bodyPr/>
+          <a:lstStyle/>
+          <a:p>
+            <a:fld id="{A0644CF0-E45A-4BE0-8348-AA9C5F857889}" type="slidenum">
+              <a:rPr lang="zh-CN" altLang="en-US" smtClean="0"/>
+              <a:t>56</a:t>
+            </a:fld>
+            <a:endParaRPr lang="zh-CN" altLang="en-US" dirty="0"/>
+          </a:p>
+        </p:txBody>
+      </p:sp>
+      <p:pic>
+        <p:nvPicPr>
+          <p:cNvPr id="12" name="图片 11">
+            <a:extLst>
+              <a:ext uri="{FF2B5EF4-FFF2-40B4-BE49-F238E27FC236}">
+                <a16:creationId xmlns:a16="http://schemas.microsoft.com/office/drawing/2014/main" id="{4E43C159-EEFA-5308-6388-2CBB897E420A}"/>
+              </a:ext>
+            </a:extLst>
+          </p:cNvPr>
+          <p:cNvPicPr>
+            <a:picLocks noChangeAspect="1"/>
+          </p:cNvPicPr>
+          <p:nvPr/>
+        </p:nvPicPr>
+        <p:blipFill>
+          <a:blip r:embed="rId3">
+            <a:extLst>
+              <a:ext uri="{28A0092B-C50C-407E-A947-70E740481C1C}">
+                <a14:useLocalDpi xmlns:a14="http://schemas.microsoft.com/office/drawing/2010/main" val="0"/>
+              </a:ext>
+            </a:extLst>
+          </a:blip>
+          <a:stretch>
+            <a:fillRect/>
+          </a:stretch>
+        </p:blipFill>
+        <p:spPr>
+          <a:xfrm>
+            <a:off x="4906153" y="2814098"/>
+            <a:ext cx="2379694" cy="2379694"/>
+          </a:xfrm>
+          <a:prstGeom prst="rect">
+            <a:avLst/>
+          </a:prstGeom>
+        </p:spPr>
+      </p:pic>
+    </p:spTree>
+    <p:extLst>
+      <p:ext uri="{BB962C8B-B14F-4D97-AF65-F5344CB8AC3E}">
+        <p14:creationId xmlns:p14="http://schemas.microsoft.com/office/powerpoint/2010/main" val="2968100061"/>
+      </p:ext>
+    </p:extLst>
+  </p:cSld>
+  <p:clrMapOvr>
+    <a:masterClrMapping/>
+  </p:clrMapOvr>
 </p:sld>
 </file>
 

</xml_diff>